<commit_message>
subindo modelagem e ptt atualizados.
</commit_message>
<xml_diff>
--- a/SLIDES_DC.pptx
+++ b/SLIDES_DC.pptx
@@ -5,37 +5,38 @@
     <p:sldMasterId id="2147483687" r:id="rId1"/>
   </p:sldMasterIdLst>
   <p:notesMasterIdLst>
-    <p:notesMasterId r:id="rId6"/>
+    <p:notesMasterId r:id="rId7"/>
   </p:notesMasterIdLst>
   <p:sldIdLst>
     <p:sldId id="256" r:id="rId2"/>
     <p:sldId id="257" r:id="rId3"/>
-    <p:sldId id="271" r:id="rId4"/>
-    <p:sldId id="272" r:id="rId5"/>
+    <p:sldId id="273" r:id="rId4"/>
+    <p:sldId id="271" r:id="rId5"/>
+    <p:sldId id="272" r:id="rId6"/>
   </p:sldIdLst>
   <p:sldSz cx="9144000" cy="5143500" type="screen16x9"/>
   <p:notesSz cx="6858000" cy="9144000"/>
   <p:embeddedFontLst>
     <p:embeddedFont>
-      <p:font typeface="Anaheim" panose="020B0604020202020204" charset="0"/>
-      <p:regular r:id="rId7"/>
+      <p:font typeface="Alata" panose="020B0604020202020204" charset="0"/>
+      <p:regular r:id="rId8"/>
+    </p:embeddedFont>
+    <p:embeddedFont>
+      <p:font typeface="Roboto Condensed Light" panose="020B0604020202020204" charset="0"/>
+      <p:regular r:id="rId9"/>
+      <p:italic r:id="rId10"/>
+    </p:embeddedFont>
+    <p:embeddedFont>
+      <p:font typeface="Arial Black" panose="020B0A04020102020204" pitchFamily="34" charset="0"/>
+      <p:bold r:id="rId11"/>
     </p:embeddedFont>
     <p:embeddedFont>
       <p:font typeface="Bangers" panose="020B0604020202020204" charset="0"/>
-      <p:regular r:id="rId8"/>
+      <p:regular r:id="rId12"/>
     </p:embeddedFont>
     <p:embeddedFont>
-      <p:font typeface="Alata" panose="020B0604020202020204" charset="0"/>
-      <p:regular r:id="rId9"/>
-    </p:embeddedFont>
-    <p:embeddedFont>
-      <p:font typeface="Roboto Condensed Light" panose="020B0604020202020204" charset="0"/>
-      <p:regular r:id="rId10"/>
-      <p:italic r:id="rId11"/>
-    </p:embeddedFont>
-    <p:embeddedFont>
-      <p:font typeface="Arial Black" panose="020B0A04020102020204" pitchFamily="34" charset="0"/>
-      <p:bold r:id="rId12"/>
+      <p:font typeface="Anaheim" panose="020B0604020202020204" charset="0"/>
+      <p:regular r:id="rId13"/>
     </p:embeddedFont>
   </p:embeddedFontLst>
   <p:defaultTextStyle>
@@ -274,6 +275,7 @@
           <p14:sldIdLst>
             <p14:sldId id="256"/>
             <p14:sldId id="257"/>
+            <p14:sldId id="273"/>
             <p14:sldId id="271"/>
             <p14:sldId id="272"/>
           </p14:sldIdLst>
@@ -20306,6 +20308,128 @@
     </p:bg>
     <p:spTree>
       <p:nvGrpSpPr>
+        <p:cNvPr id="1" name=""/>
+        <p:cNvGrpSpPr/>
+        <p:nvPr/>
+      </p:nvGrpSpPr>
+      <p:grpSpPr>
+        <a:xfrm>
+          <a:off x="0" y="0"/>
+          <a:ext cx="0" cy="0"/>
+          <a:chOff x="0" y="0"/>
+          <a:chExt cx="0" cy="0"/>
+        </a:xfrm>
+      </p:grpSpPr>
+      <p:sp>
+        <p:nvSpPr>
+          <p:cNvPr id="5" name="Google Shape;733;p43"/>
+          <p:cNvSpPr/>
+          <p:nvPr/>
+        </p:nvSpPr>
+        <p:spPr>
+          <a:xfrm>
+            <a:off x="1130062" y="1676969"/>
+            <a:ext cx="7138556" cy="1968560"/>
+          </a:xfrm>
+          <a:custGeom>
+            <a:avLst/>
+            <a:gdLst/>
+            <a:ahLst/>
+            <a:cxnLst/>
+            <a:rect l="l" t="t" r="r" b="b"/>
+            <a:pathLst>
+              <a:path w="204347" h="27247" extrusionOk="0">
+                <a:moveTo>
+                  <a:pt x="0" y="826"/>
+                </a:moveTo>
+                <a:lnTo>
+                  <a:pt x="1239" y="26008"/>
+                </a:lnTo>
+                <a:lnTo>
+                  <a:pt x="204347" y="27247"/>
+                </a:lnTo>
+                <a:lnTo>
+                  <a:pt x="200219" y="0"/>
+                </a:lnTo>
+                <a:close/>
+              </a:path>
+            </a:pathLst>
+          </a:custGeom>
+          <a:solidFill>
+            <a:schemeClr val="accent1"/>
+          </a:solidFill>
+          <a:ln w="28575" cap="flat" cmpd="sng">
+            <a:solidFill>
+              <a:schemeClr val="dk1"/>
+            </a:solidFill>
+            <a:prstDash val="solid"/>
+            <a:round/>
+            <a:headEnd type="none" w="med" len="med"/>
+            <a:tailEnd type="none" w="med" len="med"/>
+          </a:ln>
+        </p:spPr>
+      </p:sp>
+      <p:sp>
+        <p:nvSpPr>
+          <p:cNvPr id="3" name="Título 2"/>
+          <p:cNvSpPr>
+            <a:spLocks noGrp="1"/>
+          </p:cNvSpPr>
+          <p:nvPr>
+            <p:ph type="title"/>
+          </p:nvPr>
+        </p:nvSpPr>
+        <p:spPr>
+          <a:xfrm>
+            <a:off x="3767688" y="2044460"/>
+            <a:ext cx="1863304" cy="1233577"/>
+          </a:xfrm>
+        </p:spPr>
+        <p:txBody>
+          <a:bodyPr/>
+          <a:lstStyle/>
+          <a:p>
+            <a:r>
+              <a:rPr lang="pt-BR" dirty="0" smtClean="0"/>
+              <a:t>Site : </a:t>
+            </a:r>
+            <a:r>
+              <a:rPr lang="pt-BR" dirty="0" err="1" smtClean="0"/>
+              <a:t>ForumDc</a:t>
+            </a:r>
+            <a:endParaRPr lang="pt-BR" dirty="0"/>
+          </a:p>
+        </p:txBody>
+      </p:sp>
+    </p:spTree>
+    <p:extLst>
+      <p:ext uri="{BB962C8B-B14F-4D97-AF65-F5344CB8AC3E}">
+        <p14:creationId xmlns:p14="http://schemas.microsoft.com/office/powerpoint/2010/main" val="495667100"/>
+      </p:ext>
+    </p:extLst>
+  </p:cSld>
+  <p:clrMapOvr>
+    <a:masterClrMapping/>
+  </p:clrMapOvr>
+</p:sld>
+</file>
+
+<file path=ppt/slides/slide4.xml><?xml version="1.0" encoding="utf-8"?>
+<p:sld xmlns:a="http://schemas.openxmlformats.org/drawingml/2006/main" xmlns:r="http://schemas.openxmlformats.org/officeDocument/2006/relationships" xmlns:p="http://schemas.openxmlformats.org/presentationml/2006/main">
+  <p:cSld>
+    <p:bg>
+      <p:bgPr>
+        <a:solidFill>
+          <a:schemeClr val="accent1">
+            <a:lumMod val="40000"/>
+            <a:lumOff val="60000"/>
+          </a:schemeClr>
+        </a:solidFill>
+        <a:effectLst/>
+      </p:bgPr>
+    </p:bg>
+    <p:spTree>
+      <p:nvGrpSpPr>
         <p:cNvPr id="1" name="Shape 1162"/>
         <p:cNvGrpSpPr/>
         <p:nvPr/>
@@ -20460,15 +20584,15 @@
 </p:sld>
 </file>
 
-<file path=ppt/slides/slide4.xml><?xml version="1.0" encoding="utf-8"?>
+<file path=ppt/slides/slide5.xml><?xml version="1.0" encoding="utf-8"?>
 <p:sld xmlns:a="http://schemas.openxmlformats.org/drawingml/2006/main" xmlns:r="http://schemas.openxmlformats.org/officeDocument/2006/relationships" xmlns:p="http://schemas.openxmlformats.org/presentationml/2006/main">
   <p:cSld>
     <p:bg>
       <p:bgPr>
         <a:solidFill>
           <a:schemeClr val="accent1">
-            <a:lumMod val="60000"/>
-            <a:lumOff val="40000"/>
+            <a:lumMod val="40000"/>
+            <a:lumOff val="60000"/>
           </a:schemeClr>
         </a:solidFill>
         <a:effectLst/>

</xml_diff>